<commit_message>
OFİS POWERPOINT TANITIM BROŞÜR.
</commit_message>
<xml_diff>
--- a/ÖN MUHASEBE POWERPOINT.pptx
+++ b/ÖN MUHASEBE POWERPOINT.pptx
@@ -104,6 +104,11 @@
       </a:defRPr>
     </a:lvl9pPr>
   </p:defaultTextStyle>
+  <p:extLst>
+    <p:ext uri="{EFAFB233-063F-42B5-8137-9DF3F51BA10A}">
+      <p15:sldGuideLst xmlns:p15="http://schemas.microsoft.com/office/powerpoint/2012/main"/>
+    </p:ext>
+  </p:extLst>
 </p:presentation>
 </file>
 
@@ -5667,16 +5672,77 @@
             <p:ph type="ctrTitle"/>
           </p:nvPr>
         </p:nvSpPr>
-        <p:spPr/>
+        <p:spPr>
+          <a:xfrm>
+            <a:off x="1371600" y="385895"/>
+            <a:ext cx="9448800" cy="1543574"/>
+          </a:xfrm>
+        </p:spPr>
         <p:txBody>
           <a:bodyPr/>
           <a:lstStyle/>
           <a:p>
             <a:r>
-              <a:rPr lang="tr-TR" b="1" dirty="0" smtClean="0"/>
+              <a:rPr lang="tr-TR" b="1" u="sng" cap="none" dirty="0" smtClean="0">
+                <a:ln w="12700">
+                  <a:solidFill>
+                    <a:schemeClr val="accent3">
+                      <a:lumMod val="50000"/>
+                    </a:schemeClr>
+                  </a:solidFill>
+                  <a:prstDash val="solid"/>
+                </a:ln>
+                <a:pattFill prst="narHorz">
+                  <a:fgClr>
+                    <a:schemeClr val="accent3"/>
+                  </a:fgClr>
+                  <a:bgClr>
+                    <a:schemeClr val="accent3">
+                      <a:lumMod val="40000"/>
+                      <a:lumOff val="60000"/>
+                    </a:schemeClr>
+                  </a:bgClr>
+                </a:pattFill>
+                <a:effectLst>
+                  <a:innerShdw blurRad="177800">
+                    <a:schemeClr val="accent3">
+                      <a:lumMod val="50000"/>
+                    </a:schemeClr>
+                  </a:innerShdw>
+                  <a:reflection blurRad="6350" stA="55000" endA="50" endPos="85000" dist="60007" dir="5400000" sy="-100000" algn="bl" rotWithShape="0"/>
+                </a:effectLst>
+              </a:rPr>
               <a:t>ÖN MUHASEBE </a:t>
             </a:r>
-            <a:endParaRPr lang="tr-TR" b="1" dirty="0"/>
+            <a:endParaRPr lang="tr-TR" b="1" u="sng" cap="none" dirty="0">
+              <a:ln w="12700">
+                <a:solidFill>
+                  <a:schemeClr val="accent3">
+                    <a:lumMod val="50000"/>
+                  </a:schemeClr>
+                </a:solidFill>
+                <a:prstDash val="solid"/>
+              </a:ln>
+              <a:pattFill prst="narHorz">
+                <a:fgClr>
+                  <a:schemeClr val="accent3"/>
+                </a:fgClr>
+                <a:bgClr>
+                  <a:schemeClr val="accent3">
+                    <a:lumMod val="40000"/>
+                    <a:lumOff val="60000"/>
+                  </a:schemeClr>
+                </a:bgClr>
+              </a:pattFill>
+              <a:effectLst>
+                <a:innerShdw blurRad="177800">
+                  <a:schemeClr val="accent3">
+                    <a:lumMod val="50000"/>
+                  </a:schemeClr>
+                </a:innerShdw>
+                <a:reflection blurRad="6350" stA="55000" endA="50" endPos="85000" dist="60007" dir="5400000" sy="-100000" algn="bl" rotWithShape="0"/>
+              </a:effectLst>
+            </a:endParaRPr>
           </a:p>
         </p:txBody>
       </p:sp>
@@ -5692,10 +5758,24 @@
         </p:nvSpPr>
         <p:spPr>
           <a:xfrm>
-            <a:off x="1371600" y="3632201"/>
-            <a:ext cx="9448800" cy="2995102"/>
-          </a:xfrm>
-        </p:spPr>
+            <a:off x="1371600" y="1937858"/>
+            <a:ext cx="9448800" cy="1375793"/>
+          </a:xfrm>
+        </p:spPr>
+        <p:style>
+          <a:lnRef idx="1">
+            <a:schemeClr val="accent2"/>
+          </a:lnRef>
+          <a:fillRef idx="2">
+            <a:schemeClr val="accent2"/>
+          </a:fillRef>
+          <a:effectRef idx="1">
+            <a:schemeClr val="accent2"/>
+          </a:effectRef>
+          <a:fontRef idx="minor">
+            <a:schemeClr val="dk1"/>
+          </a:fontRef>
+        </p:style>
         <p:txBody>
           <a:bodyPr>
             <a:normAutofit/>
@@ -5703,26 +5783,40 @@
           <a:lstStyle/>
           <a:p>
             <a:r>
-              <a:rPr lang="tr-TR" dirty="0" smtClean="0"/>
-              <a:t>DESTEKLENEN İŞLETİM SİSTEMİ:</a:t>
-            </a:r>
-          </a:p>
-          <a:p>
-            <a:r>
-              <a:rPr lang="tr-TR" dirty="0" smtClean="0"/>
-              <a:t>WINDOWS 7 SP1,WINDOWS 8.1,10,11</a:t>
-            </a:r>
-          </a:p>
-          <a:p>
-            <a:r>
-              <a:rPr lang="tr-TR" dirty="0" smtClean="0"/>
-              <a:t>YAZILIM:MURAT IRKAN 2021/22</a:t>
-            </a:r>
-          </a:p>
-          <a:p>
-            <a:r>
-              <a:rPr lang="tr-TR" dirty="0" smtClean="0"/>
-              <a:t>DESTEK MAİL: muratir1975@windowslive.com</a:t>
+              <a:rPr lang="tr-TR" b="1" dirty="0" smtClean="0"/>
+              <a:t>DESTEKLENEN İŞLETİM </a:t>
+            </a:r>
+            <a:r>
+              <a:rPr lang="tr-TR" b="1" dirty="0"/>
+              <a:t>SİSTEMİ:WINDOWS 7 SP1,WINDOWS 8.1,10,11</a:t>
+            </a:r>
+          </a:p>
+          <a:p>
+            <a:r>
+              <a:rPr lang="tr-TR" b="1" dirty="0" smtClean="0"/>
+              <a:t>YAZILIM:MURAT </a:t>
+            </a:r>
+            <a:r>
+              <a:rPr lang="tr-TR" b="1" dirty="0" smtClean="0"/>
+              <a:t>IRKAN 2021/22</a:t>
+            </a:r>
+          </a:p>
+          <a:p>
+            <a:r>
+              <a:rPr lang="tr-TR" b="1" dirty="0" smtClean="0"/>
+              <a:t>DESTEK MAİL: </a:t>
+            </a:r>
+            <a:r>
+              <a:rPr lang="tr-TR" b="1" dirty="0" smtClean="0">
+                <a:effectLst>
+                  <a:outerShdw blurRad="50800" dist="38100" dir="5400000" algn="t" rotWithShape="0">
+                    <a:prstClr val="black">
+                      <a:alpha val="40000"/>
+                    </a:prstClr>
+                  </a:outerShdw>
+                </a:effectLst>
+              </a:rPr>
+              <a:t>muratir1975@windowslive.com</a:t>
             </a:r>
           </a:p>
           <a:p>
@@ -5739,36 +5833,89 @@
           </a:p>
         </p:txBody>
       </p:sp>
-      <p:pic>
-        <p:nvPicPr>
-          <p:cNvPr id="4" name="Picture 3"/>
-          <p:cNvPicPr>
-            <a:picLocks noChangeAspect="1"/>
-          </p:cNvPicPr>
+      <p:sp>
+        <p:nvSpPr>
+          <p:cNvPr id="5" name="TextBox 4"/>
+          <p:cNvSpPr txBox="1"/>
           <p:nvPr/>
-        </p:nvPicPr>
-        <p:blipFill>
-          <a:blip r:embed="rId2">
-            <a:extLst>
-              <a:ext uri="{28A0092B-C50C-407E-A947-70E740481C1C}">
-                <a14:useLocalDpi xmlns:a14="http://schemas.microsoft.com/office/drawing/2010/main" val="0"/>
-              </a:ext>
-            </a:extLst>
-          </a:blip>
-          <a:stretch>
-            <a:fillRect/>
-          </a:stretch>
-        </p:blipFill>
-        <p:spPr>
-          <a:xfrm>
-            <a:off x="9700470" y="5523102"/>
-            <a:ext cx="2491530" cy="1401486"/>
+        </p:nvSpPr>
+        <p:spPr>
+          <a:xfrm>
+            <a:off x="9954936" y="6488668"/>
+            <a:ext cx="2237064" cy="369332"/>
           </a:xfrm>
           <a:prstGeom prst="rect">
             <a:avLst/>
           </a:prstGeom>
         </p:spPr>
-      </p:pic>
+        <p:style>
+          <a:lnRef idx="2">
+            <a:schemeClr val="accent5"/>
+          </a:lnRef>
+          <a:fillRef idx="1">
+            <a:schemeClr val="lt1"/>
+          </a:fillRef>
+          <a:effectRef idx="0">
+            <a:schemeClr val="accent5"/>
+          </a:effectRef>
+          <a:fontRef idx="minor">
+            <a:schemeClr val="dk1"/>
+          </a:fontRef>
+        </p:style>
+        <p:txBody>
+          <a:bodyPr wrap="square" rtlCol="0">
+            <a:spAutoFit/>
+          </a:bodyPr>
+          <a:lstStyle/>
+          <a:p>
+            <a:r>
+              <a:rPr lang="tr-TR" b="1" dirty="0" smtClean="0">
+                <a:ln w="9525">
+                  <a:solidFill>
+                    <a:schemeClr val="bg1"/>
+                  </a:solidFill>
+                  <a:prstDash val="solid"/>
+                </a:ln>
+                <a:solidFill>
+                  <a:schemeClr val="accent2">
+                    <a:lumMod val="75000"/>
+                  </a:schemeClr>
+                </a:solidFill>
+                <a:effectLst>
+                  <a:outerShdw blurRad="12700" dist="38100" dir="2700000" algn="tl" rotWithShape="0">
+                    <a:schemeClr val="bg1">
+                      <a:lumMod val="50000"/>
+                    </a:schemeClr>
+                  </a:outerShdw>
+                  <a:reflection blurRad="6350" stA="60000" endA="900" endPos="60000" dist="60007" dir="5400000" sy="-100000" algn="bl" rotWithShape="0"/>
+                </a:effectLst>
+              </a:rPr>
+              <a:t>VERSİYON:2.3.05</a:t>
+            </a:r>
+            <a:endParaRPr lang="tr-TR" b="1" dirty="0">
+              <a:ln w="9525">
+                <a:solidFill>
+                  <a:schemeClr val="bg1"/>
+                </a:solidFill>
+                <a:prstDash val="solid"/>
+              </a:ln>
+              <a:solidFill>
+                <a:schemeClr val="accent2">
+                  <a:lumMod val="75000"/>
+                </a:schemeClr>
+              </a:solidFill>
+              <a:effectLst>
+                <a:outerShdw blurRad="12700" dist="38100" dir="2700000" algn="tl" rotWithShape="0">
+                  <a:schemeClr val="bg1">
+                    <a:lumMod val="50000"/>
+                  </a:schemeClr>
+                </a:outerShdw>
+                <a:reflection blurRad="6350" stA="60000" endA="900" endPos="60000" dist="60007" dir="5400000" sy="-100000" algn="bl" rotWithShape="0"/>
+              </a:effectLst>
+            </a:endParaRPr>
+          </a:p>
+        </p:txBody>
+      </p:sp>
     </p:spTree>
     <p:extLst>
       <p:ext uri="{BB962C8B-B14F-4D97-AF65-F5344CB8AC3E}">
@@ -5867,9 +6014,7 @@
                                         </p:cTn>
                                         <p:tgtEl>
                                           <p:spTgt spid="3">
-                                            <p:txEl>
-                                              <p:pRg st="0" end="0"/>
-                                            </p:txEl>
+                                            <p:bg/>
                                           </p:spTgt>
                                         </p:tgtEl>
                                         <p:attrNameLst>
@@ -5885,9 +6030,7 @@
                                         <p:cTn id="12" dur="2000"/>
                                         <p:tgtEl>
                                           <p:spTgt spid="3">
-                                            <p:txEl>
-                                              <p:pRg st="0" end="0"/>
-                                            </p:txEl>
+                                            <p:bg/>
                                           </p:spTgt>
                                         </p:tgtEl>
                                       </p:cBhvr>
@@ -5929,7 +6072,7 @@
                                         <p:tgtEl>
                                           <p:spTgt spid="3">
                                             <p:txEl>
-                                              <p:pRg st="1" end="1"/>
+                                              <p:pRg st="0" end="0"/>
                                             </p:txEl>
                                           </p:spTgt>
                                         </p:tgtEl>
@@ -5947,7 +6090,7 @@
                                         <p:tgtEl>
                                           <p:spTgt spid="3">
                                             <p:txEl>
-                                              <p:pRg st="1" end="1"/>
+                                              <p:pRg st="0" end="0"/>
                                             </p:txEl>
                                           </p:spTgt>
                                         </p:tgtEl>
@@ -5990,7 +6133,7 @@
                                         <p:tgtEl>
                                           <p:spTgt spid="3">
                                             <p:txEl>
-                                              <p:pRg st="2" end="2"/>
+                                              <p:pRg st="1" end="1"/>
                                             </p:txEl>
                                           </p:spTgt>
                                         </p:tgtEl>
@@ -6008,7 +6151,7 @@
                                         <p:tgtEl>
                                           <p:spTgt spid="3">
                                             <p:txEl>
-                                              <p:pRg st="2" end="2"/>
+                                              <p:pRg st="1" end="1"/>
                                             </p:txEl>
                                           </p:spTgt>
                                         </p:tgtEl>
@@ -6051,7 +6194,7 @@
                                         <p:tgtEl>
                                           <p:spTgt spid="3">
                                             <p:txEl>
-                                              <p:pRg st="3" end="3"/>
+                                              <p:pRg st="2" end="2"/>
                                             </p:txEl>
                                           </p:spTgt>
                                         </p:tgtEl>
@@ -6069,56 +6212,12 @@
                                         <p:tgtEl>
                                           <p:spTgt spid="3">
                                             <p:txEl>
-                                              <p:pRg st="3" end="3"/>
+                                              <p:pRg st="2" end="2"/>
                                             </p:txEl>
                                           </p:spTgt>
                                         </p:tgtEl>
                                       </p:cBhvr>
                                     </p:animEffect>
-                                  </p:childTnLst>
-                                </p:cTn>
-                              </p:par>
-                            </p:childTnLst>
-                          </p:cTn>
-                        </p:par>
-                      </p:childTnLst>
-                    </p:cTn>
-                  </p:par>
-                  <p:par>
-                    <p:cTn id="28" fill="hold">
-                      <p:stCondLst>
-                        <p:cond delay="indefinite"/>
-                      </p:stCondLst>
-                      <p:childTnLst>
-                        <p:par>
-                          <p:cTn id="29" fill="hold">
-                            <p:stCondLst>
-                              <p:cond delay="0"/>
-                            </p:stCondLst>
-                            <p:childTnLst>
-                              <p:par>
-                                <p:cTn id="30" presetID="26" presetClass="emph" presetSubtype="0" fill="hold" nodeType="clickEffect">
-                                  <p:stCondLst>
-                                    <p:cond delay="0"/>
-                                  </p:stCondLst>
-                                  <p:childTnLst>
-                                    <p:animEffect transition="out" filter="fade">
-                                      <p:cBhvr>
-                                        <p:cTn id="31" dur="500" tmFilter="0, 0; .2, .5; .8, .5; 1, 0"/>
-                                        <p:tgtEl>
-                                          <p:spTgt spid="4"/>
-                                        </p:tgtEl>
-                                      </p:cBhvr>
-                                    </p:animEffect>
-                                    <p:animScale>
-                                      <p:cBhvr>
-                                        <p:cTn id="32" dur="250" autoRev="1" fill="hold"/>
-                                        <p:tgtEl>
-                                          <p:spTgt spid="4"/>
-                                        </p:tgtEl>
-                                      </p:cBhvr>
-                                      <p:by x="105000" y="105000"/>
-                                    </p:animScale>
                                   </p:childTnLst>
                                 </p:cTn>
                               </p:par>
@@ -6151,7 +6250,7 @@
     </p:tnLst>
     <p:bldLst>
       <p:bldP spid="2" grpId="0"/>
-      <p:bldP spid="3" grpId="0" build="p"/>
+      <p:bldP spid="3" grpId="0" build="p" animBg="1"/>
     </p:bldLst>
   </p:timing>
 </p:sld>

</xml_diff>